<commit_message>
minor updates to section 8
</commit_message>
<xml_diff>
--- a/presentations/8 - The adventure begins.pptx
+++ b/presentations/8 - The adventure begins.pptx
@@ -206,7 +206,7 @@
           <a:p>
             <a:fld id="{F66424AC-637E-4C16-A5EC-04F4842B5A71}" type="datetimeFigureOut">
               <a:rPr lang="en-US" smtClean="0"/>
-              <a:t>4/8/2025</a:t>
+              <a:t>4/10/2025</a:t>
             </a:fld>
             <a:endParaRPr lang="en-US"/>
           </a:p>
@@ -519,7 +519,15 @@
           <a:p>
             <a:r>
               <a:rPr lang="en-US" dirty="0"/>
-              <a:t>So the class that Justin and I would LOVE to teach someday is intermediate/advanced R.  Which maybe we will someday.</a:t>
+              <a:t>So the class </a:t>
+            </a:r>
+            <a:r>
+              <a:rPr lang="en-US"/>
+              <a:t>that Logan </a:t>
+            </a:r>
+            <a:r>
+              <a:rPr lang="en-US" dirty="0"/>
+              <a:t>and I would LOVE to teach someday is intermediate/advanced R.  Which maybe we will someday.</a:t>
             </a:r>
           </a:p>
           <a:p>
@@ -1673,7 +1681,7 @@
           <a:p>
             <a:fld id="{F9F57C4A-2F7E-45A6-9631-DF8F6C2C902F}" type="datetimeFigureOut">
               <a:rPr lang="en-US" smtClean="0"/>
-              <a:t>4/8/2025</a:t>
+              <a:t>4/10/2025</a:t>
             </a:fld>
             <a:endParaRPr lang="en-US"/>
           </a:p>
@@ -1871,7 +1879,7 @@
           <a:p>
             <a:fld id="{F9F57C4A-2F7E-45A6-9631-DF8F6C2C902F}" type="datetimeFigureOut">
               <a:rPr lang="en-US" smtClean="0"/>
-              <a:t>4/8/2025</a:t>
+              <a:t>4/10/2025</a:t>
             </a:fld>
             <a:endParaRPr lang="en-US"/>
           </a:p>
@@ -2079,7 +2087,7 @@
           <a:p>
             <a:fld id="{F9F57C4A-2F7E-45A6-9631-DF8F6C2C902F}" type="datetimeFigureOut">
               <a:rPr lang="en-US" smtClean="0"/>
-              <a:t>4/8/2025</a:t>
+              <a:t>4/10/2025</a:t>
             </a:fld>
             <a:endParaRPr lang="en-US"/>
           </a:p>
@@ -2277,7 +2285,7 @@
           <a:p>
             <a:fld id="{F9F57C4A-2F7E-45A6-9631-DF8F6C2C902F}" type="datetimeFigureOut">
               <a:rPr lang="en-US" smtClean="0"/>
-              <a:t>4/8/2025</a:t>
+              <a:t>4/10/2025</a:t>
             </a:fld>
             <a:endParaRPr lang="en-US"/>
           </a:p>
@@ -2552,7 +2560,7 @@
           <a:p>
             <a:fld id="{F9F57C4A-2F7E-45A6-9631-DF8F6C2C902F}" type="datetimeFigureOut">
               <a:rPr lang="en-US" smtClean="0"/>
-              <a:t>4/8/2025</a:t>
+              <a:t>4/10/2025</a:t>
             </a:fld>
             <a:endParaRPr lang="en-US"/>
           </a:p>
@@ -2817,7 +2825,7 @@
           <a:p>
             <a:fld id="{F9F57C4A-2F7E-45A6-9631-DF8F6C2C902F}" type="datetimeFigureOut">
               <a:rPr lang="en-US" smtClean="0"/>
-              <a:t>4/8/2025</a:t>
+              <a:t>4/10/2025</a:t>
             </a:fld>
             <a:endParaRPr lang="en-US"/>
           </a:p>
@@ -3229,7 +3237,7 @@
           <a:p>
             <a:fld id="{F9F57C4A-2F7E-45A6-9631-DF8F6C2C902F}" type="datetimeFigureOut">
               <a:rPr lang="en-US" smtClean="0"/>
-              <a:t>4/8/2025</a:t>
+              <a:t>4/10/2025</a:t>
             </a:fld>
             <a:endParaRPr lang="en-US"/>
           </a:p>
@@ -3370,7 +3378,7 @@
           <a:p>
             <a:fld id="{F9F57C4A-2F7E-45A6-9631-DF8F6C2C902F}" type="datetimeFigureOut">
               <a:rPr lang="en-US" smtClean="0"/>
-              <a:t>4/8/2025</a:t>
+              <a:t>4/10/2025</a:t>
             </a:fld>
             <a:endParaRPr lang="en-US"/>
           </a:p>
@@ -3483,7 +3491,7 @@
           <a:p>
             <a:fld id="{F9F57C4A-2F7E-45A6-9631-DF8F6C2C902F}" type="datetimeFigureOut">
               <a:rPr lang="en-US" smtClean="0"/>
-              <a:t>4/8/2025</a:t>
+              <a:t>4/10/2025</a:t>
             </a:fld>
             <a:endParaRPr lang="en-US"/>
           </a:p>
@@ -3794,7 +3802,7 @@
           <a:p>
             <a:fld id="{F9F57C4A-2F7E-45A6-9631-DF8F6C2C902F}" type="datetimeFigureOut">
               <a:rPr lang="en-US" smtClean="0"/>
-              <a:t>4/8/2025</a:t>
+              <a:t>4/10/2025</a:t>
             </a:fld>
             <a:endParaRPr lang="en-US"/>
           </a:p>
@@ -4082,7 +4090,7 @@
           <a:p>
             <a:fld id="{F9F57C4A-2F7E-45A6-9631-DF8F6C2C902F}" type="datetimeFigureOut">
               <a:rPr lang="en-US" smtClean="0"/>
-              <a:t>4/8/2025</a:t>
+              <a:t>4/10/2025</a:t>
             </a:fld>
             <a:endParaRPr lang="en-US"/>
           </a:p>
@@ -4323,7 +4331,7 @@
           <a:p>
             <a:fld id="{F9F57C4A-2F7E-45A6-9631-DF8F6C2C902F}" type="datetimeFigureOut">
               <a:rPr lang="en-US" smtClean="0"/>
-              <a:t>4/8/2025</a:t>
+              <a:t>4/10/2025</a:t>
             </a:fld>
             <a:endParaRPr lang="en-US"/>
           </a:p>

</xml_diff>

<commit_message>
Edits to PPT 1,8,9. Added cheatsheets
</commit_message>
<xml_diff>
--- a/presentations/8 - The adventure begins.pptx
+++ b/presentations/8 - The adventure begins.pptx
@@ -5,7 +5,7 @@
     <p:sldMasterId id="2147483648" r:id="rId1"/>
   </p:sldMasterIdLst>
   <p:notesMasterIdLst>
-    <p:notesMasterId r:id="rId12"/>
+    <p:notesMasterId r:id="rId15"/>
   </p:notesMasterIdLst>
   <p:sldIdLst>
     <p:sldId id="256" r:id="rId2"/>
@@ -18,6 +18,9 @@
     <p:sldId id="265" r:id="rId9"/>
     <p:sldId id="261" r:id="rId10"/>
     <p:sldId id="262" r:id="rId11"/>
+    <p:sldId id="266" r:id="rId12"/>
+    <p:sldId id="267" r:id="rId13"/>
+    <p:sldId id="268" r:id="rId14"/>
   </p:sldIdLst>
   <p:sldSz cx="12192000" cy="6858000"/>
   <p:notesSz cx="6858000" cy="9144000"/>
@@ -206,7 +209,7 @@
           <a:p>
             <a:fld id="{F66424AC-637E-4C16-A5EC-04F4842B5A71}" type="datetimeFigureOut">
               <a:rPr lang="en-US" smtClean="0"/>
-              <a:t>4/10/2025</a:t>
+              <a:t>4/14/2025</a:t>
             </a:fld>
             <a:endParaRPr lang="en-US"/>
           </a:p>
@@ -1681,7 +1684,7 @@
           <a:p>
             <a:fld id="{F9F57C4A-2F7E-45A6-9631-DF8F6C2C902F}" type="datetimeFigureOut">
               <a:rPr lang="en-US" smtClean="0"/>
-              <a:t>4/10/2025</a:t>
+              <a:t>4/14/2025</a:t>
             </a:fld>
             <a:endParaRPr lang="en-US"/>
           </a:p>
@@ -1879,7 +1882,7 @@
           <a:p>
             <a:fld id="{F9F57C4A-2F7E-45A6-9631-DF8F6C2C902F}" type="datetimeFigureOut">
               <a:rPr lang="en-US" smtClean="0"/>
-              <a:t>4/10/2025</a:t>
+              <a:t>4/14/2025</a:t>
             </a:fld>
             <a:endParaRPr lang="en-US"/>
           </a:p>
@@ -2087,7 +2090,7 @@
           <a:p>
             <a:fld id="{F9F57C4A-2F7E-45A6-9631-DF8F6C2C902F}" type="datetimeFigureOut">
               <a:rPr lang="en-US" smtClean="0"/>
-              <a:t>4/10/2025</a:t>
+              <a:t>4/14/2025</a:t>
             </a:fld>
             <a:endParaRPr lang="en-US"/>
           </a:p>
@@ -2285,7 +2288,7 @@
           <a:p>
             <a:fld id="{F9F57C4A-2F7E-45A6-9631-DF8F6C2C902F}" type="datetimeFigureOut">
               <a:rPr lang="en-US" smtClean="0"/>
-              <a:t>4/10/2025</a:t>
+              <a:t>4/14/2025</a:t>
             </a:fld>
             <a:endParaRPr lang="en-US"/>
           </a:p>
@@ -2560,7 +2563,7 @@
           <a:p>
             <a:fld id="{F9F57C4A-2F7E-45A6-9631-DF8F6C2C902F}" type="datetimeFigureOut">
               <a:rPr lang="en-US" smtClean="0"/>
-              <a:t>4/10/2025</a:t>
+              <a:t>4/14/2025</a:t>
             </a:fld>
             <a:endParaRPr lang="en-US"/>
           </a:p>
@@ -2825,7 +2828,7 @@
           <a:p>
             <a:fld id="{F9F57C4A-2F7E-45A6-9631-DF8F6C2C902F}" type="datetimeFigureOut">
               <a:rPr lang="en-US" smtClean="0"/>
-              <a:t>4/10/2025</a:t>
+              <a:t>4/14/2025</a:t>
             </a:fld>
             <a:endParaRPr lang="en-US"/>
           </a:p>
@@ -3237,7 +3240,7 @@
           <a:p>
             <a:fld id="{F9F57C4A-2F7E-45A6-9631-DF8F6C2C902F}" type="datetimeFigureOut">
               <a:rPr lang="en-US" smtClean="0"/>
-              <a:t>4/10/2025</a:t>
+              <a:t>4/14/2025</a:t>
             </a:fld>
             <a:endParaRPr lang="en-US"/>
           </a:p>
@@ -3378,7 +3381,7 @@
           <a:p>
             <a:fld id="{F9F57C4A-2F7E-45A6-9631-DF8F6C2C902F}" type="datetimeFigureOut">
               <a:rPr lang="en-US" smtClean="0"/>
-              <a:t>4/10/2025</a:t>
+              <a:t>4/14/2025</a:t>
             </a:fld>
             <a:endParaRPr lang="en-US"/>
           </a:p>
@@ -3491,7 +3494,7 @@
           <a:p>
             <a:fld id="{F9F57C4A-2F7E-45A6-9631-DF8F6C2C902F}" type="datetimeFigureOut">
               <a:rPr lang="en-US" smtClean="0"/>
-              <a:t>4/10/2025</a:t>
+              <a:t>4/14/2025</a:t>
             </a:fld>
             <a:endParaRPr lang="en-US"/>
           </a:p>
@@ -3802,7 +3805,7 @@
           <a:p>
             <a:fld id="{F9F57C4A-2F7E-45A6-9631-DF8F6C2C902F}" type="datetimeFigureOut">
               <a:rPr lang="en-US" smtClean="0"/>
-              <a:t>4/10/2025</a:t>
+              <a:t>4/14/2025</a:t>
             </a:fld>
             <a:endParaRPr lang="en-US"/>
           </a:p>
@@ -4090,7 +4093,7 @@
           <a:p>
             <a:fld id="{F9F57C4A-2F7E-45A6-9631-DF8F6C2C902F}" type="datetimeFigureOut">
               <a:rPr lang="en-US" smtClean="0"/>
-              <a:t>4/10/2025</a:t>
+              <a:t>4/14/2025</a:t>
             </a:fld>
             <a:endParaRPr lang="en-US"/>
           </a:p>
@@ -4331,7 +4334,7 @@
           <a:p>
             <a:fld id="{F9F57C4A-2F7E-45A6-9631-DF8F6C2C902F}" type="datetimeFigureOut">
               <a:rPr lang="en-US" smtClean="0"/>
-              <a:t>4/10/2025</a:t>
+              <a:t>4/14/2025</a:t>
             </a:fld>
             <a:endParaRPr lang="en-US"/>
           </a:p>
@@ -5339,6 +5342,337 @@
       </p:par>
     </p:tnLst>
   </p:timing>
+</p:sld>
+</file>
+
+<file path=ppt/slides/slide11.xml><?xml version="1.0" encoding="utf-8"?>
+<p:sld xmlns:a="http://schemas.openxmlformats.org/drawingml/2006/main" xmlns:r="http://schemas.openxmlformats.org/officeDocument/2006/relationships" xmlns:p="http://schemas.openxmlformats.org/presentationml/2006/main">
+  <p:cSld>
+    <p:spTree>
+      <p:nvGrpSpPr>
+        <p:cNvPr id="1" name=""/>
+        <p:cNvGrpSpPr/>
+        <p:nvPr/>
+      </p:nvGrpSpPr>
+      <p:grpSpPr>
+        <a:xfrm>
+          <a:off x="0" y="0"/>
+          <a:ext cx="0" cy="0"/>
+          <a:chOff x="0" y="0"/>
+          <a:chExt cx="0" cy="0"/>
+        </a:xfrm>
+      </p:grpSpPr>
+      <p:sp>
+        <p:nvSpPr>
+          <p:cNvPr id="2" name="Title 1">
+            <a:extLst>
+              <a:ext uri="{FF2B5EF4-FFF2-40B4-BE49-F238E27FC236}">
+                <a16:creationId xmlns:a16="http://schemas.microsoft.com/office/drawing/2014/main" id="{159DA841-6775-8938-212D-BC6661E4AA12}"/>
+              </a:ext>
+            </a:extLst>
+          </p:cNvPr>
+          <p:cNvSpPr>
+            <a:spLocks noGrp="1"/>
+          </p:cNvSpPr>
+          <p:nvPr>
+            <p:ph type="title"/>
+          </p:nvPr>
+        </p:nvSpPr>
+        <p:spPr/>
+        <p:txBody>
+          <a:bodyPr/>
+          <a:lstStyle/>
+          <a:p>
+            <a:r>
+              <a:rPr lang="en-US" dirty="0" err="1"/>
+              <a:t>Plotly</a:t>
+            </a:r>
+            <a:r>
+              <a:rPr lang="en-US" dirty="0"/>
+              <a:t> – Interactive Plots</a:t>
+            </a:r>
+          </a:p>
+        </p:txBody>
+      </p:sp>
+      <p:pic>
+        <p:nvPicPr>
+          <p:cNvPr id="7" name="Picture 6" descr="Chart, scatter chart&#10;&#10;Description automatically generated">
+            <a:extLst>
+              <a:ext uri="{FF2B5EF4-FFF2-40B4-BE49-F238E27FC236}">
+                <a16:creationId xmlns:a16="http://schemas.microsoft.com/office/drawing/2014/main" id="{4C687BB3-AF5B-6B83-52B1-B4413DFE5B58}"/>
+              </a:ext>
+            </a:extLst>
+          </p:cNvPr>
+          <p:cNvPicPr>
+            <a:picLocks noChangeAspect="1"/>
+          </p:cNvPicPr>
+          <p:nvPr/>
+        </p:nvPicPr>
+        <p:blipFill>
+          <a:blip r:embed="rId2">
+            <a:extLst>
+              <a:ext uri="{28A0092B-C50C-407E-A947-70E740481C1C}">
+                <a14:useLocalDpi xmlns:a14="http://schemas.microsoft.com/office/drawing/2010/main" val="0"/>
+              </a:ext>
+            </a:extLst>
+          </a:blip>
+          <a:stretch>
+            <a:fillRect/>
+          </a:stretch>
+        </p:blipFill>
+        <p:spPr>
+          <a:xfrm>
+            <a:off x="1975534" y="2208503"/>
+            <a:ext cx="8240932" cy="4235278"/>
+          </a:xfrm>
+          <a:prstGeom prst="rect">
+            <a:avLst/>
+          </a:prstGeom>
+          <a:ln>
+            <a:solidFill>
+              <a:schemeClr val="accent1"/>
+            </a:solidFill>
+          </a:ln>
+        </p:spPr>
+      </p:pic>
+    </p:spTree>
+    <p:extLst>
+      <p:ext uri="{BB962C8B-B14F-4D97-AF65-F5344CB8AC3E}">
+        <p14:creationId xmlns:p14="http://schemas.microsoft.com/office/powerpoint/2010/main" val="3200123542"/>
+      </p:ext>
+    </p:extLst>
+  </p:cSld>
+  <p:clrMapOvr>
+    <a:masterClrMapping/>
+  </p:clrMapOvr>
+</p:sld>
+</file>
+
+<file path=ppt/slides/slide12.xml><?xml version="1.0" encoding="utf-8"?>
+<p:sld xmlns:a="http://schemas.openxmlformats.org/drawingml/2006/main" xmlns:r="http://schemas.openxmlformats.org/officeDocument/2006/relationships" xmlns:p="http://schemas.openxmlformats.org/presentationml/2006/main">
+  <p:cSld>
+    <p:spTree>
+      <p:nvGrpSpPr>
+        <p:cNvPr id="1" name=""/>
+        <p:cNvGrpSpPr/>
+        <p:nvPr/>
+      </p:nvGrpSpPr>
+      <p:grpSpPr>
+        <a:xfrm>
+          <a:off x="0" y="0"/>
+          <a:ext cx="0" cy="0"/>
+          <a:chOff x="0" y="0"/>
+          <a:chExt cx="0" cy="0"/>
+        </a:xfrm>
+      </p:grpSpPr>
+      <p:sp>
+        <p:nvSpPr>
+          <p:cNvPr id="2" name="Title 1">
+            <a:extLst>
+              <a:ext uri="{FF2B5EF4-FFF2-40B4-BE49-F238E27FC236}">
+                <a16:creationId xmlns:a16="http://schemas.microsoft.com/office/drawing/2014/main" id="{8215670A-E7C8-C803-94A9-BB995D0C0210}"/>
+              </a:ext>
+            </a:extLst>
+          </p:cNvPr>
+          <p:cNvSpPr>
+            <a:spLocks noGrp="1"/>
+          </p:cNvSpPr>
+          <p:nvPr>
+            <p:ph type="title"/>
+          </p:nvPr>
+        </p:nvSpPr>
+        <p:spPr/>
+        <p:txBody>
+          <a:bodyPr/>
+          <a:lstStyle/>
+          <a:p>
+            <a:r>
+              <a:rPr lang="en-US" dirty="0"/>
+              <a:t>Animated Plots</a:t>
+            </a:r>
+          </a:p>
+        </p:txBody>
+      </p:sp>
+      <p:pic>
+        <p:nvPicPr>
+          <p:cNvPr id="5" name="Picture 4" descr="Chart, scatter chart&#10;&#10;Description automatically generated">
+            <a:extLst>
+              <a:ext uri="{FF2B5EF4-FFF2-40B4-BE49-F238E27FC236}">
+                <a16:creationId xmlns:a16="http://schemas.microsoft.com/office/drawing/2014/main" id="{AA5AD3B2-E385-5656-C470-1D930F0602A7}"/>
+              </a:ext>
+            </a:extLst>
+          </p:cNvPr>
+          <p:cNvPicPr>
+            <a:picLocks noChangeAspect="1"/>
+          </p:cNvPicPr>
+          <p:nvPr/>
+        </p:nvPicPr>
+        <p:blipFill>
+          <a:blip r:embed="rId2">
+            <a:extLst>
+              <a:ext uri="{28A0092B-C50C-407E-A947-70E740481C1C}">
+                <a14:useLocalDpi xmlns:a14="http://schemas.microsoft.com/office/drawing/2010/main" val="0"/>
+              </a:ext>
+            </a:extLst>
+          </a:blip>
+          <a:stretch>
+            <a:fillRect/>
+          </a:stretch>
+        </p:blipFill>
+        <p:spPr>
+          <a:xfrm>
+            <a:off x="838200" y="1920875"/>
+            <a:ext cx="4572000" cy="4572000"/>
+          </a:xfrm>
+          <a:prstGeom prst="rect">
+            <a:avLst/>
+          </a:prstGeom>
+          <a:ln>
+            <a:solidFill>
+              <a:schemeClr val="accent1"/>
+            </a:solidFill>
+          </a:ln>
+        </p:spPr>
+      </p:pic>
+      <p:pic>
+        <p:nvPicPr>
+          <p:cNvPr id="7" name="Picture 6" descr="Chart, bar chart, histogram&#10;&#10;Description automatically generated">
+            <a:extLst>
+              <a:ext uri="{FF2B5EF4-FFF2-40B4-BE49-F238E27FC236}">
+                <a16:creationId xmlns:a16="http://schemas.microsoft.com/office/drawing/2014/main" id="{7A7D7182-A9C2-3651-CE2F-83C917494FE2}"/>
+              </a:ext>
+            </a:extLst>
+          </p:cNvPr>
+          <p:cNvPicPr>
+            <a:picLocks noChangeAspect="1"/>
+          </p:cNvPicPr>
+          <p:nvPr/>
+        </p:nvPicPr>
+        <p:blipFill>
+          <a:blip r:embed="rId3">
+            <a:extLst>
+              <a:ext uri="{28A0092B-C50C-407E-A947-70E740481C1C}">
+                <a14:useLocalDpi xmlns:a14="http://schemas.microsoft.com/office/drawing/2010/main" val="0"/>
+              </a:ext>
+            </a:extLst>
+          </a:blip>
+          <a:stretch>
+            <a:fillRect/>
+          </a:stretch>
+        </p:blipFill>
+        <p:spPr>
+          <a:xfrm>
+            <a:off x="5521959" y="2392997"/>
+            <a:ext cx="6446521" cy="3581401"/>
+          </a:xfrm>
+          <a:prstGeom prst="rect">
+            <a:avLst/>
+          </a:prstGeom>
+          <a:ln>
+            <a:solidFill>
+              <a:schemeClr val="accent1"/>
+            </a:solidFill>
+          </a:ln>
+        </p:spPr>
+      </p:pic>
+    </p:spTree>
+    <p:extLst>
+      <p:ext uri="{BB962C8B-B14F-4D97-AF65-F5344CB8AC3E}">
+        <p14:creationId xmlns:p14="http://schemas.microsoft.com/office/powerpoint/2010/main" val="1949729298"/>
+      </p:ext>
+    </p:extLst>
+  </p:cSld>
+  <p:clrMapOvr>
+    <a:masterClrMapping/>
+  </p:clrMapOvr>
+</p:sld>
+</file>
+
+<file path=ppt/slides/slide13.xml><?xml version="1.0" encoding="utf-8"?>
+<p:sld xmlns:a="http://schemas.openxmlformats.org/drawingml/2006/main" xmlns:r="http://schemas.openxmlformats.org/officeDocument/2006/relationships" xmlns:p="http://schemas.openxmlformats.org/presentationml/2006/main">
+  <p:cSld>
+    <p:spTree>
+      <p:nvGrpSpPr>
+        <p:cNvPr id="1" name=""/>
+        <p:cNvGrpSpPr/>
+        <p:nvPr/>
+      </p:nvGrpSpPr>
+      <p:grpSpPr>
+        <a:xfrm>
+          <a:off x="0" y="0"/>
+          <a:ext cx="0" cy="0"/>
+          <a:chOff x="0" y="0"/>
+          <a:chExt cx="0" cy="0"/>
+        </a:xfrm>
+      </p:grpSpPr>
+      <p:sp>
+        <p:nvSpPr>
+          <p:cNvPr id="2" name="Title 1">
+            <a:extLst>
+              <a:ext uri="{FF2B5EF4-FFF2-40B4-BE49-F238E27FC236}">
+                <a16:creationId xmlns:a16="http://schemas.microsoft.com/office/drawing/2014/main" id="{A63F64C0-56E3-4C90-EC0A-186CDBEA2C3A}"/>
+              </a:ext>
+            </a:extLst>
+          </p:cNvPr>
+          <p:cNvSpPr>
+            <a:spLocks noGrp="1"/>
+          </p:cNvSpPr>
+          <p:nvPr>
+            <p:ph type="title"/>
+          </p:nvPr>
+        </p:nvSpPr>
+        <p:spPr/>
+        <p:txBody>
+          <a:bodyPr/>
+          <a:lstStyle/>
+          <a:p>
+            <a:r>
+              <a:rPr lang="en-US" dirty="0"/>
+              <a:t>AI </a:t>
+            </a:r>
+          </a:p>
+        </p:txBody>
+      </p:sp>
+      <p:pic>
+        <p:nvPicPr>
+          <p:cNvPr id="7" name="Picture 6">
+            <a:extLst>
+              <a:ext uri="{FF2B5EF4-FFF2-40B4-BE49-F238E27FC236}">
+                <a16:creationId xmlns:a16="http://schemas.microsoft.com/office/drawing/2014/main" id="{98E1B029-183A-4429-97F7-6631D223B145}"/>
+              </a:ext>
+            </a:extLst>
+          </p:cNvPr>
+          <p:cNvPicPr>
+            <a:picLocks noChangeAspect="1"/>
+          </p:cNvPicPr>
+          <p:nvPr/>
+        </p:nvPicPr>
+        <p:blipFill>
+          <a:blip r:embed="rId2"/>
+          <a:stretch>
+            <a:fillRect/>
+          </a:stretch>
+        </p:blipFill>
+        <p:spPr>
+          <a:xfrm>
+            <a:off x="2217682" y="365125"/>
+            <a:ext cx="9039895" cy="6042401"/>
+          </a:xfrm>
+          <a:prstGeom prst="rect">
+            <a:avLst/>
+          </a:prstGeom>
+        </p:spPr>
+      </p:pic>
+    </p:spTree>
+    <p:extLst>
+      <p:ext uri="{BB962C8B-B14F-4D97-AF65-F5344CB8AC3E}">
+        <p14:creationId xmlns:p14="http://schemas.microsoft.com/office/powerpoint/2010/main" val="3523031483"/>
+      </p:ext>
+    </p:extLst>
+  </p:cSld>
+  <p:clrMapOvr>
+    <a:masterClrMapping/>
+  </p:clrMapOvr>
 </p:sld>
 </file>
 

</xml_diff>